<commit_message>
Add Framework & UI&Sound feature commit
1. Add Csv
2. Add Resource
3. Add PPT
4. Add Sound
5. Add MainTitle, SelectMode, StageName
6. Add logic in DevScenes
</commit_message>
<xml_diff>
--- a/Personal Mockup Project-Isaac Repentance Bin/PPT/2024-11-25 SFML 아이작 모작 발표.pptx
+++ b/Personal Mockup Project-Isaac Repentance Bin/PPT/2024-11-25 SFML 아이작 모작 발표.pptx
@@ -6,6 +6,12 @@
   </p:sldMasterIdLst>
   <p:sldIdLst>
     <p:sldId id="256" r:id="rId2"/>
+    <p:sldId id="257" r:id="rId3"/>
+    <p:sldId id="258" r:id="rId4"/>
+    <p:sldId id="259" r:id="rId5"/>
+    <p:sldId id="260" r:id="rId6"/>
+    <p:sldId id="261" r:id="rId7"/>
+    <p:sldId id="262" r:id="rId8"/>
   </p:sldIdLst>
   <p:sldSz cx="12192000" cy="6858000"/>
   <p:notesSz cx="6858000" cy="9144000"/>
@@ -104,6 +110,11 @@
       </a:defRPr>
     </a:lvl9pPr>
   </p:defaultTextStyle>
+  <p:extLst>
+    <p:ext uri="{EFAFB233-063F-42B5-8137-9DF3F51BA10A}">
+      <p15:sldGuideLst xmlns:p15="http://schemas.microsoft.com/office/powerpoint/2012/main"/>
+    </p:ext>
+  </p:extLst>
 </p:presentation>
 </file>
 
@@ -275,7 +286,7 @@
           <a:p>
             <a:fld id="{04616311-6F12-4689-96C9-1A1192C6E26E}" type="datetimeFigureOut">
               <a:rPr lang="ko-KR" altLang="en-US" smtClean="0"/>
-              <a:t>2024-11-23 (Sat)</a:t>
+              <a:t>2024-11-24 (Sun)</a:t>
             </a:fld>
             <a:endParaRPr lang="ko-KR" altLang="en-US"/>
           </a:p>
@@ -503,7 +514,7 @@
           <a:p>
             <a:fld id="{04616311-6F12-4689-96C9-1A1192C6E26E}" type="datetimeFigureOut">
               <a:rPr lang="ko-KR" altLang="en-US" smtClean="0"/>
-              <a:t>2024-11-23 (Sat)</a:t>
+              <a:t>2024-11-24 (Sun)</a:t>
             </a:fld>
             <a:endParaRPr lang="ko-KR" altLang="en-US"/>
           </a:p>
@@ -683,7 +694,7 @@
           <a:p>
             <a:fld id="{04616311-6F12-4689-96C9-1A1192C6E26E}" type="datetimeFigureOut">
               <a:rPr lang="ko-KR" altLang="en-US" smtClean="0"/>
-              <a:t>2024-11-23 (Sat)</a:t>
+              <a:t>2024-11-24 (Sun)</a:t>
             </a:fld>
             <a:endParaRPr lang="ko-KR" altLang="en-US"/>
           </a:p>
@@ -853,7 +864,7 @@
           <a:p>
             <a:fld id="{04616311-6F12-4689-96C9-1A1192C6E26E}" type="datetimeFigureOut">
               <a:rPr lang="ko-KR" altLang="en-US" smtClean="0"/>
-              <a:t>2024-11-23 (Sat)</a:t>
+              <a:t>2024-11-24 (Sun)</a:t>
             </a:fld>
             <a:endParaRPr lang="ko-KR" altLang="en-US"/>
           </a:p>
@@ -1107,7 +1118,7 @@
           <a:p>
             <a:fld id="{04616311-6F12-4689-96C9-1A1192C6E26E}" type="datetimeFigureOut">
               <a:rPr lang="ko-KR" altLang="en-US" smtClean="0"/>
-              <a:t>2024-11-23 (Sat)</a:t>
+              <a:t>2024-11-24 (Sun)</a:t>
             </a:fld>
             <a:endParaRPr lang="ko-KR" altLang="en-US"/>
           </a:p>
@@ -1433,7 +1444,7 @@
           <a:p>
             <a:fld id="{04616311-6F12-4689-96C9-1A1192C6E26E}" type="datetimeFigureOut">
               <a:rPr lang="ko-KR" altLang="en-US" smtClean="0"/>
-              <a:t>2024-11-23 (Sat)</a:t>
+              <a:t>2024-11-24 (Sun)</a:t>
             </a:fld>
             <a:endParaRPr lang="ko-KR" altLang="en-US"/>
           </a:p>
@@ -1884,7 +1895,7 @@
           <a:p>
             <a:fld id="{04616311-6F12-4689-96C9-1A1192C6E26E}" type="datetimeFigureOut">
               <a:rPr lang="ko-KR" altLang="en-US" smtClean="0"/>
-              <a:t>2024-11-23 (Sat)</a:t>
+              <a:t>2024-11-24 (Sun)</a:t>
             </a:fld>
             <a:endParaRPr lang="ko-KR" altLang="en-US"/>
           </a:p>
@@ -2002,7 +2013,7 @@
           <a:p>
             <a:fld id="{04616311-6F12-4689-96C9-1A1192C6E26E}" type="datetimeFigureOut">
               <a:rPr lang="ko-KR" altLang="en-US" smtClean="0"/>
-              <a:t>2024-11-23 (Sat)</a:t>
+              <a:t>2024-11-24 (Sun)</a:t>
             </a:fld>
             <a:endParaRPr lang="ko-KR" altLang="en-US"/>
           </a:p>
@@ -2097,7 +2108,7 @@
           <a:p>
             <a:fld id="{04616311-6F12-4689-96C9-1A1192C6E26E}" type="datetimeFigureOut">
               <a:rPr lang="ko-KR" altLang="en-US" smtClean="0"/>
-              <a:t>2024-11-23 (Sat)</a:t>
+              <a:t>2024-11-24 (Sun)</a:t>
             </a:fld>
             <a:endParaRPr lang="ko-KR" altLang="en-US"/>
           </a:p>
@@ -2384,7 +2395,7 @@
           <a:p>
             <a:fld id="{04616311-6F12-4689-96C9-1A1192C6E26E}" type="datetimeFigureOut">
               <a:rPr lang="ko-KR" altLang="en-US" smtClean="0"/>
-              <a:t>2024-11-23 (Sat)</a:t>
+              <a:t>2024-11-24 (Sun)</a:t>
             </a:fld>
             <a:endParaRPr lang="ko-KR" altLang="en-US"/>
           </a:p>
@@ -2706,7 +2717,7 @@
           <a:p>
             <a:fld id="{04616311-6F12-4689-96C9-1A1192C6E26E}" type="datetimeFigureOut">
               <a:rPr lang="ko-KR" altLang="en-US" smtClean="0"/>
-              <a:t>2024-11-23 (Sat)</a:t>
+              <a:t>2024-11-24 (Sun)</a:t>
             </a:fld>
             <a:endParaRPr lang="ko-KR" altLang="en-US"/>
           </a:p>
@@ -2960,7 +2971,7 @@
           <a:p>
             <a:fld id="{04616311-6F12-4689-96C9-1A1192C6E26E}" type="datetimeFigureOut">
               <a:rPr lang="ko-KR" altLang="en-US" smtClean="0"/>
-              <a:t>2024-11-23 (Sat)</a:t>
+              <a:t>2024-11-24 (Sun)</a:t>
             </a:fld>
             <a:endParaRPr lang="ko-KR" altLang="en-US"/>
           </a:p>
@@ -3466,16 +3477,27 @@
         </p:nvSpPr>
         <p:spPr>
           <a:xfrm>
-            <a:off x="1261872" y="365760"/>
-            <a:ext cx="9418320" cy="4434840"/>
+            <a:off x="1261872" y="111423"/>
+            <a:ext cx="9418320" cy="3394786"/>
           </a:xfrm>
         </p:spPr>
         <p:txBody>
-          <a:bodyPr/>
+          <a:bodyPr>
+            <a:normAutofit/>
+          </a:bodyPr>
           <a:lstStyle/>
           <a:p>
             <a:pPr algn="ctr"/>
-            <a:endParaRPr lang="ko-KR" altLang="en-US" dirty="0"/>
+            <a:r>
+              <a:rPr lang="en-US" altLang="ko-KR" dirty="0">
+                <a:effectLst/>
+              </a:rPr>
+              <a:t>The Binding Of Isaac : Repentance - </a:t>
+            </a:r>
+            <a:r>
+              <a:rPr lang="ko-KR" altLang="en-US" dirty="0"/>
+              <a:t>모작</a:t>
+            </a:r>
           </a:p>
         </p:txBody>
       </p:sp>
@@ -3508,6 +3530,916 @@
     <p:extLst>
       <p:ext uri="{BB962C8B-B14F-4D97-AF65-F5344CB8AC3E}">
         <p14:creationId xmlns:p14="http://schemas.microsoft.com/office/powerpoint/2010/main" val="4289206115"/>
+      </p:ext>
+    </p:extLst>
+  </p:cSld>
+  <p:clrMapOvr>
+    <a:masterClrMapping/>
+  </p:clrMapOvr>
+</p:sld>
+</file>
+
+<file path=ppt/slides/slide2.xml><?xml version="1.0" encoding="utf-8"?>
+<p:sld xmlns:a="http://schemas.openxmlformats.org/drawingml/2006/main" xmlns:r="http://schemas.openxmlformats.org/officeDocument/2006/relationships" xmlns:p="http://schemas.openxmlformats.org/presentationml/2006/main">
+  <p:cSld>
+    <p:spTree>
+      <p:nvGrpSpPr>
+        <p:cNvPr id="1" name=""/>
+        <p:cNvGrpSpPr/>
+        <p:nvPr/>
+      </p:nvGrpSpPr>
+      <p:grpSpPr>
+        <a:xfrm>
+          <a:off x="0" y="0"/>
+          <a:ext cx="0" cy="0"/>
+          <a:chOff x="0" y="0"/>
+          <a:chExt cx="0" cy="0"/>
+        </a:xfrm>
+      </p:grpSpPr>
+      <p:sp>
+        <p:nvSpPr>
+          <p:cNvPr id="2" name="제목 1">
+            <a:extLst>
+              <a:ext uri="{FF2B5EF4-FFF2-40B4-BE49-F238E27FC236}">
+                <a16:creationId xmlns:a16="http://schemas.microsoft.com/office/drawing/2014/main" id="{13847D07-4C9C-0FCF-0730-93C2D6682A9B}"/>
+              </a:ext>
+            </a:extLst>
+          </p:cNvPr>
+          <p:cNvSpPr>
+            <a:spLocks noGrp="1"/>
+          </p:cNvSpPr>
+          <p:nvPr>
+            <p:ph type="title"/>
+          </p:nvPr>
+        </p:nvSpPr>
+        <p:spPr/>
+        <p:txBody>
+          <a:bodyPr/>
+          <a:lstStyle/>
+          <a:p>
+            <a:r>
+              <a:rPr lang="ko-KR" altLang="en-US" dirty="0"/>
+              <a:t>게임 소개</a:t>
+            </a:r>
+          </a:p>
+        </p:txBody>
+      </p:sp>
+      <p:sp>
+        <p:nvSpPr>
+          <p:cNvPr id="3" name="내용 개체 틀 2">
+            <a:extLst>
+              <a:ext uri="{FF2B5EF4-FFF2-40B4-BE49-F238E27FC236}">
+                <a16:creationId xmlns:a16="http://schemas.microsoft.com/office/drawing/2014/main" id="{B1DD083D-30CD-CF14-C4F7-15A763EC3668}"/>
+              </a:ext>
+            </a:extLst>
+          </p:cNvPr>
+          <p:cNvSpPr>
+            <a:spLocks noGrp="1"/>
+          </p:cNvSpPr>
+          <p:nvPr>
+            <p:ph idx="1"/>
+          </p:nvPr>
+        </p:nvSpPr>
+        <p:spPr/>
+        <p:txBody>
+          <a:bodyPr/>
+          <a:lstStyle/>
+          <a:p>
+            <a:r>
+              <a:rPr lang="ko-KR" altLang="en-US" dirty="0"/>
+              <a:t>플레이어가 각 층의 던전을 탐색</a:t>
+            </a:r>
+            <a:endParaRPr lang="en-US" altLang="ko-KR" dirty="0"/>
+          </a:p>
+          <a:p>
+            <a:r>
+              <a:rPr lang="ko-KR" altLang="en-US" dirty="0"/>
+              <a:t>몬스터를 잡으면서 </a:t>
+            </a:r>
+            <a:r>
+              <a:rPr lang="ko-KR" altLang="en-US" dirty="0" err="1"/>
+              <a:t>나아감</a:t>
+            </a:r>
+            <a:endParaRPr lang="en-US" altLang="ko-KR" dirty="0"/>
+          </a:p>
+          <a:p>
+            <a:r>
+              <a:rPr lang="ko-KR" altLang="en-US" dirty="0"/>
+              <a:t>보스</a:t>
+            </a:r>
+            <a:r>
+              <a:rPr lang="en-US" altLang="ko-KR" dirty="0"/>
+              <a:t>, </a:t>
+            </a:r>
+            <a:r>
+              <a:rPr lang="ko-KR" altLang="en-US" dirty="0"/>
+              <a:t>아이템 획득</a:t>
+            </a:r>
+            <a:r>
+              <a:rPr lang="en-US" altLang="ko-KR" dirty="0"/>
+              <a:t>, </a:t>
+            </a:r>
+            <a:r>
+              <a:rPr lang="ko-KR" altLang="en-US" dirty="0"/>
+              <a:t>상점 등 다양한 요소 존재</a:t>
+            </a:r>
+            <a:endParaRPr lang="en-US" altLang="ko-KR" dirty="0"/>
+          </a:p>
+          <a:p>
+            <a:r>
+              <a:rPr lang="ko-KR" altLang="en-US" dirty="0"/>
+              <a:t>여러 엔딩도 존재</a:t>
+            </a:r>
+          </a:p>
+        </p:txBody>
+      </p:sp>
+    </p:spTree>
+    <p:extLst>
+      <p:ext uri="{BB962C8B-B14F-4D97-AF65-F5344CB8AC3E}">
+        <p14:creationId xmlns:p14="http://schemas.microsoft.com/office/powerpoint/2010/main" val="410001493"/>
+      </p:ext>
+    </p:extLst>
+  </p:cSld>
+  <p:clrMapOvr>
+    <a:masterClrMapping/>
+  </p:clrMapOvr>
+</p:sld>
+</file>
+
+<file path=ppt/slides/slide3.xml><?xml version="1.0" encoding="utf-8"?>
+<p:sld xmlns:a="http://schemas.openxmlformats.org/drawingml/2006/main" xmlns:r="http://schemas.openxmlformats.org/officeDocument/2006/relationships" xmlns:p="http://schemas.openxmlformats.org/presentationml/2006/main">
+  <p:cSld>
+    <p:spTree>
+      <p:nvGrpSpPr>
+        <p:cNvPr id="1" name=""/>
+        <p:cNvGrpSpPr/>
+        <p:nvPr/>
+      </p:nvGrpSpPr>
+      <p:grpSpPr>
+        <a:xfrm>
+          <a:off x="0" y="0"/>
+          <a:ext cx="0" cy="0"/>
+          <a:chOff x="0" y="0"/>
+          <a:chExt cx="0" cy="0"/>
+        </a:xfrm>
+      </p:grpSpPr>
+      <p:sp>
+        <p:nvSpPr>
+          <p:cNvPr id="2" name="제목 1">
+            <a:extLst>
+              <a:ext uri="{FF2B5EF4-FFF2-40B4-BE49-F238E27FC236}">
+                <a16:creationId xmlns:a16="http://schemas.microsoft.com/office/drawing/2014/main" id="{F5EF31B3-AB67-D38D-AB75-E8DFDA24BA04}"/>
+              </a:ext>
+            </a:extLst>
+          </p:cNvPr>
+          <p:cNvSpPr>
+            <a:spLocks noGrp="1"/>
+          </p:cNvSpPr>
+          <p:nvPr>
+            <p:ph type="title"/>
+          </p:nvPr>
+        </p:nvSpPr>
+        <p:spPr/>
+        <p:txBody>
+          <a:bodyPr/>
+          <a:lstStyle/>
+          <a:p>
+            <a:r>
+              <a:rPr lang="ko-KR" altLang="en-US" dirty="0"/>
+              <a:t>구현한 범위</a:t>
+            </a:r>
+          </a:p>
+        </p:txBody>
+      </p:sp>
+      <p:sp>
+        <p:nvSpPr>
+          <p:cNvPr id="3" name="내용 개체 틀 2">
+            <a:extLst>
+              <a:ext uri="{FF2B5EF4-FFF2-40B4-BE49-F238E27FC236}">
+                <a16:creationId xmlns:a16="http://schemas.microsoft.com/office/drawing/2014/main" id="{C09C706C-EBE0-36A1-5C96-B4C297D7C26C}"/>
+              </a:ext>
+            </a:extLst>
+          </p:cNvPr>
+          <p:cNvSpPr>
+            <a:spLocks noGrp="1"/>
+          </p:cNvSpPr>
+          <p:nvPr>
+            <p:ph idx="1"/>
+          </p:nvPr>
+        </p:nvSpPr>
+        <p:spPr/>
+        <p:txBody>
+          <a:bodyPr/>
+          <a:lstStyle/>
+          <a:p>
+            <a:r>
+              <a:rPr lang="ko-KR" altLang="en-US" dirty="0"/>
+              <a:t>메인 화면</a:t>
+            </a:r>
+            <a:endParaRPr lang="en-US" altLang="ko-KR" dirty="0"/>
+          </a:p>
+          <a:p>
+            <a:endParaRPr lang="en-US" altLang="ko-KR" dirty="0"/>
+          </a:p>
+          <a:p>
+            <a:r>
+              <a:rPr lang="ko-KR" altLang="en-US" dirty="0"/>
+              <a:t>게임 화면 </a:t>
+            </a:r>
+            <a:r>
+              <a:rPr lang="en-US" altLang="ko-KR" dirty="0"/>
+              <a:t>– </a:t>
+            </a:r>
+            <a:r>
+              <a:rPr lang="ko-KR" altLang="en-US" dirty="0"/>
+              <a:t>전투 방</a:t>
+            </a:r>
+            <a:r>
+              <a:rPr lang="en-US" altLang="ko-KR" dirty="0"/>
+              <a:t>, </a:t>
+            </a:r>
+            <a:r>
+              <a:rPr lang="ko-KR" altLang="en-US" dirty="0"/>
+              <a:t>플레이어</a:t>
+            </a:r>
+            <a:r>
+              <a:rPr lang="en-US" altLang="ko-KR" dirty="0"/>
+              <a:t>,</a:t>
+            </a:r>
+            <a:r>
+              <a:rPr lang="ko-KR" altLang="en-US" dirty="0"/>
+              <a:t> 몬스터 등등</a:t>
+            </a:r>
+            <a:r>
+              <a:rPr lang="en-US" altLang="ko-KR" dirty="0"/>
+              <a:t>…</a:t>
+            </a:r>
+          </a:p>
+          <a:p>
+            <a:r>
+              <a:rPr lang="ko-KR" altLang="en-US" dirty="0"/>
+              <a:t>사운드</a:t>
+            </a:r>
+            <a:endParaRPr lang="en-US" altLang="ko-KR" dirty="0"/>
+          </a:p>
+          <a:p>
+            <a:r>
+              <a:rPr lang="ko-KR" altLang="en-US" dirty="0"/>
+              <a:t>디버깅 모드 </a:t>
+            </a:r>
+            <a:r>
+              <a:rPr lang="en-US" altLang="ko-KR" dirty="0"/>
+              <a:t>: </a:t>
+            </a:r>
+            <a:r>
+              <a:rPr lang="ko-KR" altLang="en-US" dirty="0"/>
+              <a:t>히트 박스</a:t>
+            </a:r>
+            <a:endParaRPr lang="en-US" altLang="ko-KR" dirty="0"/>
+          </a:p>
+          <a:p>
+            <a:endParaRPr lang="en-US" altLang="ko-KR" dirty="0"/>
+          </a:p>
+          <a:p>
+            <a:r>
+              <a:rPr lang="ko-KR" altLang="en-US" dirty="0"/>
+              <a:t>사용한 기법</a:t>
+            </a:r>
+            <a:endParaRPr lang="en-US" altLang="ko-KR" dirty="0"/>
+          </a:p>
+          <a:p>
+            <a:r>
+              <a:rPr lang="en-US" altLang="ko-KR" dirty="0" err="1"/>
+              <a:t>FrameWork</a:t>
+            </a:r>
+            <a:r>
+              <a:rPr lang="en-US" altLang="ko-KR" dirty="0"/>
+              <a:t>: </a:t>
+            </a:r>
+            <a:r>
+              <a:rPr lang="en-US" altLang="ko-KR" dirty="0" err="1"/>
+              <a:t>c++</a:t>
+            </a:r>
+            <a:r>
+              <a:rPr lang="ko-KR" altLang="en-US" dirty="0"/>
+              <a:t> 연습 겸 제작</a:t>
+            </a:r>
+            <a:r>
+              <a:rPr lang="en-US" altLang="ko-KR" dirty="0"/>
+              <a:t>, UTF-8 </a:t>
+            </a:r>
+            <a:r>
+              <a:rPr lang="ko-KR" altLang="en-US" dirty="0"/>
+              <a:t>인코딩 </a:t>
+            </a:r>
+            <a:r>
+              <a:rPr lang="en-US" altLang="ko-KR" dirty="0"/>
+              <a:t>&amp; </a:t>
+            </a:r>
+            <a:r>
+              <a:rPr lang="en-US" altLang="ko-KR" dirty="0" err="1"/>
+              <a:t>wstring</a:t>
+            </a:r>
+            <a:r>
+              <a:rPr lang="ko-KR" altLang="en-US" dirty="0"/>
+              <a:t>사용</a:t>
+            </a:r>
+            <a:r>
+              <a:rPr lang="en-US" altLang="ko-KR" dirty="0"/>
+              <a:t>, </a:t>
+            </a:r>
+            <a:r>
+              <a:rPr lang="ko-KR" altLang="en-US" dirty="0"/>
+              <a:t>기존의 포인터 </a:t>
+            </a:r>
+            <a:r>
+              <a:rPr lang="en-US" altLang="ko-KR" dirty="0"/>
+              <a:t>-&gt; </a:t>
+            </a:r>
+            <a:r>
+              <a:rPr lang="en-US" altLang="ko-KR" dirty="0" err="1"/>
+              <a:t>shared_ptr</a:t>
+            </a:r>
+            <a:r>
+              <a:rPr lang="ko-KR" altLang="en-US" dirty="0"/>
+              <a:t>를 사용</a:t>
+            </a:r>
+            <a:r>
+              <a:rPr lang="en-US" altLang="ko-KR" dirty="0"/>
+              <a:t>,  Json &amp; Csv </a:t>
+            </a:r>
+            <a:r>
+              <a:rPr lang="ko-KR" altLang="en-US" dirty="0"/>
+              <a:t>파일 입출력을 사용 등등</a:t>
+            </a:r>
+            <a:r>
+              <a:rPr lang="en-US" altLang="ko-KR" dirty="0"/>
+              <a:t>…</a:t>
+            </a:r>
+            <a:endParaRPr lang="ko-KR" altLang="en-US" dirty="0"/>
+          </a:p>
+        </p:txBody>
+      </p:sp>
+    </p:spTree>
+    <p:extLst>
+      <p:ext uri="{BB962C8B-B14F-4D97-AF65-F5344CB8AC3E}">
+        <p14:creationId xmlns:p14="http://schemas.microsoft.com/office/powerpoint/2010/main" val="1793657188"/>
+      </p:ext>
+    </p:extLst>
+  </p:cSld>
+  <p:clrMapOvr>
+    <a:masterClrMapping/>
+  </p:clrMapOvr>
+</p:sld>
+</file>
+
+<file path=ppt/slides/slide4.xml><?xml version="1.0" encoding="utf-8"?>
+<p:sld xmlns:a="http://schemas.openxmlformats.org/drawingml/2006/main" xmlns:r="http://schemas.openxmlformats.org/officeDocument/2006/relationships" xmlns:p="http://schemas.openxmlformats.org/presentationml/2006/main">
+  <p:cSld>
+    <p:spTree>
+      <p:nvGrpSpPr>
+        <p:cNvPr id="1" name=""/>
+        <p:cNvGrpSpPr/>
+        <p:nvPr/>
+      </p:nvGrpSpPr>
+      <p:grpSpPr>
+        <a:xfrm>
+          <a:off x="0" y="0"/>
+          <a:ext cx="0" cy="0"/>
+          <a:chOff x="0" y="0"/>
+          <a:chExt cx="0" cy="0"/>
+        </a:xfrm>
+      </p:grpSpPr>
+      <p:sp>
+        <p:nvSpPr>
+          <p:cNvPr id="2" name="제목 1">
+            <a:extLst>
+              <a:ext uri="{FF2B5EF4-FFF2-40B4-BE49-F238E27FC236}">
+                <a16:creationId xmlns:a16="http://schemas.microsoft.com/office/drawing/2014/main" id="{98F71915-6CAB-3B58-B32D-701A97E44F82}"/>
+              </a:ext>
+            </a:extLst>
+          </p:cNvPr>
+          <p:cNvSpPr>
+            <a:spLocks noGrp="1"/>
+          </p:cNvSpPr>
+          <p:nvPr>
+            <p:ph type="title"/>
+          </p:nvPr>
+        </p:nvSpPr>
+        <p:spPr/>
+        <p:txBody>
+          <a:bodyPr/>
+          <a:lstStyle/>
+          <a:p>
+            <a:r>
+              <a:rPr lang="ko-KR" altLang="en-US" dirty="0"/>
+              <a:t>일정</a:t>
+            </a:r>
+          </a:p>
+        </p:txBody>
+      </p:sp>
+      <p:sp>
+        <p:nvSpPr>
+          <p:cNvPr id="3" name="내용 개체 틀 2">
+            <a:extLst>
+              <a:ext uri="{FF2B5EF4-FFF2-40B4-BE49-F238E27FC236}">
+                <a16:creationId xmlns:a16="http://schemas.microsoft.com/office/drawing/2014/main" id="{C1C7E1C6-169D-C9EC-FD0A-4C9E5B754EDC}"/>
+              </a:ext>
+            </a:extLst>
+          </p:cNvPr>
+          <p:cNvSpPr>
+            <a:spLocks noGrp="1"/>
+          </p:cNvSpPr>
+          <p:nvPr>
+            <p:ph idx="1"/>
+          </p:nvPr>
+        </p:nvSpPr>
+        <p:spPr/>
+        <p:txBody>
+          <a:bodyPr/>
+          <a:lstStyle/>
+          <a:p>
+            <a:pPr>
+              <a:buFont typeface="+mj-lt"/>
+              <a:buAutoNum type="arabicPeriod"/>
+            </a:pPr>
+            <a:r>
+              <a:rPr lang="ko-KR" altLang="en-US" dirty="0"/>
+              <a:t>프로젝트 생성 및 프로젝트 </a:t>
+            </a:r>
+            <a:r>
+              <a:rPr lang="ko-KR" altLang="en-US" dirty="0" err="1"/>
+              <a:t>파일링</a:t>
+            </a:r>
+            <a:endParaRPr lang="ko-KR" altLang="en-US" dirty="0"/>
+          </a:p>
+          <a:p>
+            <a:pPr>
+              <a:buFont typeface="+mj-lt"/>
+              <a:buAutoNum type="arabicPeriod"/>
+            </a:pPr>
+            <a:r>
+              <a:rPr lang="ko-KR" altLang="en-US" dirty="0"/>
+              <a:t>프로젝트 설정</a:t>
+            </a:r>
+          </a:p>
+          <a:p>
+            <a:pPr>
+              <a:buFont typeface="+mj-lt"/>
+              <a:buAutoNum type="arabicPeriod"/>
+            </a:pPr>
+            <a:r>
+              <a:rPr lang="ko-KR" altLang="en-US" dirty="0"/>
+              <a:t>개인 프레임 워크 제작</a:t>
+            </a:r>
+          </a:p>
+          <a:p>
+            <a:pPr>
+              <a:buFont typeface="+mj-lt"/>
+              <a:buAutoNum type="arabicPeriod"/>
+            </a:pPr>
+            <a:r>
+              <a:rPr lang="ko-KR" altLang="en-US" dirty="0"/>
+              <a:t>전투 방 구현</a:t>
+            </a:r>
+            <a:endParaRPr lang="en-US" altLang="ko-KR" dirty="0"/>
+          </a:p>
+          <a:p>
+            <a:pPr>
+              <a:buFont typeface="+mj-lt"/>
+              <a:buAutoNum type="arabicPeriod"/>
+            </a:pPr>
+            <a:r>
+              <a:rPr lang="ko-KR" altLang="en-US" dirty="0"/>
+              <a:t>플레이어 이동 </a:t>
+            </a:r>
+            <a:r>
+              <a:rPr lang="en-US" altLang="ko-KR" dirty="0"/>
+              <a:t>+ </a:t>
+            </a:r>
+            <a:r>
+              <a:rPr lang="ko-KR" altLang="en-US" dirty="0"/>
+              <a:t>공격 </a:t>
+            </a:r>
+            <a:r>
+              <a:rPr lang="en-US" altLang="ko-KR" dirty="0"/>
+              <a:t>(</a:t>
+            </a:r>
+            <a:r>
+              <a:rPr lang="ko-KR" altLang="en-US" dirty="0"/>
+              <a:t>애니메이션</a:t>
+            </a:r>
+            <a:r>
+              <a:rPr lang="en-US" altLang="ko-KR" dirty="0"/>
+              <a:t>)</a:t>
+            </a:r>
+          </a:p>
+          <a:p>
+            <a:pPr>
+              <a:buFont typeface="+mj-lt"/>
+              <a:buAutoNum type="arabicPeriod"/>
+            </a:pPr>
+            <a:r>
+              <a:rPr lang="ko-KR" altLang="en-US" dirty="0"/>
+              <a:t>몬스터 이동 </a:t>
+            </a:r>
+            <a:r>
+              <a:rPr lang="en-US" altLang="ko-KR" dirty="0"/>
+              <a:t>+ </a:t>
+            </a:r>
+            <a:r>
+              <a:rPr lang="ko-KR" altLang="en-US" dirty="0"/>
+              <a:t>피격 </a:t>
+            </a:r>
+            <a:r>
+              <a:rPr lang="en-US" altLang="ko-KR" dirty="0"/>
+              <a:t>(</a:t>
+            </a:r>
+            <a:r>
+              <a:rPr lang="ko-KR" altLang="en-US" dirty="0"/>
+              <a:t>애니메이션</a:t>
+            </a:r>
+            <a:r>
+              <a:rPr lang="en-US" altLang="ko-KR" dirty="0"/>
+              <a:t>)</a:t>
+            </a:r>
+          </a:p>
+          <a:p>
+            <a:pPr>
+              <a:buFont typeface="+mj-lt"/>
+              <a:buAutoNum type="arabicPeriod"/>
+            </a:pPr>
+            <a:r>
+              <a:rPr lang="ko-KR" altLang="en-US" dirty="0"/>
+              <a:t>메인 타이틀 → 동작 선택 화면</a:t>
+            </a:r>
+            <a:r>
+              <a:rPr lang="en-US" altLang="ko-KR" dirty="0"/>
+              <a:t>(</a:t>
+            </a:r>
+            <a:r>
+              <a:rPr lang="ko-KR" altLang="en-US" dirty="0"/>
+              <a:t>새 게임</a:t>
+            </a:r>
+            <a:r>
+              <a:rPr lang="en-US" altLang="ko-KR" dirty="0"/>
+              <a:t>) + </a:t>
+            </a:r>
+            <a:r>
+              <a:rPr lang="ko-KR" altLang="en-US" dirty="0"/>
+              <a:t>사운드</a:t>
+            </a:r>
+          </a:p>
+        </p:txBody>
+      </p:sp>
+    </p:spTree>
+    <p:extLst>
+      <p:ext uri="{BB962C8B-B14F-4D97-AF65-F5344CB8AC3E}">
+        <p14:creationId xmlns:p14="http://schemas.microsoft.com/office/powerpoint/2010/main" val="2796899859"/>
+      </p:ext>
+    </p:extLst>
+  </p:cSld>
+  <p:clrMapOvr>
+    <a:masterClrMapping/>
+  </p:clrMapOvr>
+</p:sld>
+</file>
+
+<file path=ppt/slides/slide5.xml><?xml version="1.0" encoding="utf-8"?>
+<p:sld xmlns:a="http://schemas.openxmlformats.org/drawingml/2006/main" xmlns:r="http://schemas.openxmlformats.org/officeDocument/2006/relationships" xmlns:p="http://schemas.openxmlformats.org/presentationml/2006/main">
+  <p:cSld>
+    <p:spTree>
+      <p:nvGrpSpPr>
+        <p:cNvPr id="1" name=""/>
+        <p:cNvGrpSpPr/>
+        <p:nvPr/>
+      </p:nvGrpSpPr>
+      <p:grpSpPr>
+        <a:xfrm>
+          <a:off x="0" y="0"/>
+          <a:ext cx="0" cy="0"/>
+          <a:chOff x="0" y="0"/>
+          <a:chExt cx="0" cy="0"/>
+        </a:xfrm>
+      </p:grpSpPr>
+      <p:sp>
+        <p:nvSpPr>
+          <p:cNvPr id="2" name="제목 1">
+            <a:extLst>
+              <a:ext uri="{FF2B5EF4-FFF2-40B4-BE49-F238E27FC236}">
+                <a16:creationId xmlns:a16="http://schemas.microsoft.com/office/drawing/2014/main" id="{79975193-64C6-B255-96F6-58C63FA5E5BA}"/>
+              </a:ext>
+            </a:extLst>
+          </p:cNvPr>
+          <p:cNvSpPr>
+            <a:spLocks noGrp="1"/>
+          </p:cNvSpPr>
+          <p:nvPr>
+            <p:ph type="title"/>
+          </p:nvPr>
+        </p:nvSpPr>
+        <p:spPr/>
+        <p:txBody>
+          <a:bodyPr/>
+          <a:lstStyle/>
+          <a:p>
+            <a:r>
+              <a:rPr lang="ko-KR" altLang="en-US" dirty="0"/>
+              <a:t>구현 내용 발표</a:t>
+            </a:r>
+          </a:p>
+        </p:txBody>
+      </p:sp>
+      <p:sp>
+        <p:nvSpPr>
+          <p:cNvPr id="3" name="내용 개체 틀 2">
+            <a:extLst>
+              <a:ext uri="{FF2B5EF4-FFF2-40B4-BE49-F238E27FC236}">
+                <a16:creationId xmlns:a16="http://schemas.microsoft.com/office/drawing/2014/main" id="{693DF8F9-5BBB-F4A1-85D3-AE4F267268F5}"/>
+              </a:ext>
+            </a:extLst>
+          </p:cNvPr>
+          <p:cNvSpPr>
+            <a:spLocks noGrp="1"/>
+          </p:cNvSpPr>
+          <p:nvPr>
+            <p:ph idx="1"/>
+          </p:nvPr>
+        </p:nvSpPr>
+        <p:spPr/>
+        <p:txBody>
+          <a:bodyPr/>
+          <a:lstStyle/>
+          <a:p>
+            <a:r>
+              <a:rPr lang="ko-KR" altLang="en-US" dirty="0"/>
+              <a:t>시연</a:t>
+            </a:r>
+          </a:p>
+        </p:txBody>
+      </p:sp>
+    </p:spTree>
+    <p:extLst>
+      <p:ext uri="{BB962C8B-B14F-4D97-AF65-F5344CB8AC3E}">
+        <p14:creationId xmlns:p14="http://schemas.microsoft.com/office/powerpoint/2010/main" val="597745389"/>
+      </p:ext>
+    </p:extLst>
+  </p:cSld>
+  <p:clrMapOvr>
+    <a:masterClrMapping/>
+  </p:clrMapOvr>
+</p:sld>
+</file>
+
+<file path=ppt/slides/slide6.xml><?xml version="1.0" encoding="utf-8"?>
+<p:sld xmlns:a="http://schemas.openxmlformats.org/drawingml/2006/main" xmlns:r="http://schemas.openxmlformats.org/officeDocument/2006/relationships" xmlns:p="http://schemas.openxmlformats.org/presentationml/2006/main">
+  <p:cSld>
+    <p:spTree>
+      <p:nvGrpSpPr>
+        <p:cNvPr id="1" name=""/>
+        <p:cNvGrpSpPr/>
+        <p:nvPr/>
+      </p:nvGrpSpPr>
+      <p:grpSpPr>
+        <a:xfrm>
+          <a:off x="0" y="0"/>
+          <a:ext cx="0" cy="0"/>
+          <a:chOff x="0" y="0"/>
+          <a:chExt cx="0" cy="0"/>
+        </a:xfrm>
+      </p:grpSpPr>
+      <p:sp>
+        <p:nvSpPr>
+          <p:cNvPr id="2" name="제목 1">
+            <a:extLst>
+              <a:ext uri="{FF2B5EF4-FFF2-40B4-BE49-F238E27FC236}">
+                <a16:creationId xmlns:a16="http://schemas.microsoft.com/office/drawing/2014/main" id="{7E770DDE-D20C-5EB1-9E9E-C21BC4FC1FF2}"/>
+              </a:ext>
+            </a:extLst>
+          </p:cNvPr>
+          <p:cNvSpPr>
+            <a:spLocks noGrp="1"/>
+          </p:cNvSpPr>
+          <p:nvPr>
+            <p:ph type="title"/>
+          </p:nvPr>
+        </p:nvSpPr>
+        <p:spPr/>
+        <p:txBody>
+          <a:bodyPr/>
+          <a:lstStyle/>
+          <a:p>
+            <a:r>
+              <a:rPr lang="ko-KR" altLang="en-US" dirty="0"/>
+              <a:t>좋았던 점 </a:t>
+            </a:r>
+            <a:r>
+              <a:rPr lang="en-US" altLang="ko-KR" dirty="0"/>
+              <a:t>&amp; </a:t>
+            </a:r>
+            <a:r>
+              <a:rPr lang="ko-KR" altLang="en-US" dirty="0"/>
+              <a:t>아쉬운 점</a:t>
+            </a:r>
+          </a:p>
+        </p:txBody>
+      </p:sp>
+      <p:sp>
+        <p:nvSpPr>
+          <p:cNvPr id="3" name="내용 개체 틀 2">
+            <a:extLst>
+              <a:ext uri="{FF2B5EF4-FFF2-40B4-BE49-F238E27FC236}">
+                <a16:creationId xmlns:a16="http://schemas.microsoft.com/office/drawing/2014/main" id="{BE66D2A8-667A-AC11-A255-C47B62F17881}"/>
+              </a:ext>
+            </a:extLst>
+          </p:cNvPr>
+          <p:cNvSpPr>
+            <a:spLocks noGrp="1"/>
+          </p:cNvSpPr>
+          <p:nvPr>
+            <p:ph idx="1"/>
+          </p:nvPr>
+        </p:nvSpPr>
+        <p:spPr/>
+        <p:txBody>
+          <a:bodyPr/>
+          <a:lstStyle/>
+          <a:p>
+            <a:r>
+              <a:rPr lang="ko-KR" altLang="en-US" dirty="0"/>
+              <a:t>좋았던 점</a:t>
+            </a:r>
+            <a:endParaRPr lang="en-US" altLang="ko-KR" dirty="0"/>
+          </a:p>
+          <a:p>
+            <a:r>
+              <a:rPr lang="en-US" altLang="ko-KR" dirty="0"/>
+              <a:t>C++</a:t>
+            </a:r>
+            <a:r>
+              <a:rPr lang="ko-KR" altLang="en-US" dirty="0"/>
+              <a:t>로 직접 게임을 만들어 본 것은 처음이라 실력 향상에 많은 도움이 되었고</a:t>
+            </a:r>
+            <a:r>
+              <a:rPr lang="en-US" altLang="ko-KR" dirty="0"/>
+              <a:t>, </a:t>
+            </a:r>
+            <a:r>
+              <a:rPr lang="ko-KR" altLang="en-US" dirty="0"/>
+              <a:t>좋은 경험이었다</a:t>
+            </a:r>
+            <a:r>
+              <a:rPr lang="en-US" altLang="ko-KR" dirty="0"/>
+              <a:t>.</a:t>
+            </a:r>
+          </a:p>
+          <a:p>
+            <a:pPr marL="0" indent="0">
+              <a:buNone/>
+            </a:pPr>
+            <a:endParaRPr lang="en-US" altLang="ko-KR" dirty="0"/>
+          </a:p>
+          <a:p>
+            <a:r>
+              <a:rPr lang="ko-KR" altLang="en-US" dirty="0"/>
+              <a:t>아쉬운 점</a:t>
+            </a:r>
+            <a:endParaRPr lang="en-US" altLang="ko-KR" dirty="0"/>
+          </a:p>
+          <a:p>
+            <a:r>
+              <a:rPr lang="ko-KR" altLang="en-US" dirty="0"/>
+              <a:t>시간 부족으로 일정 축소화 </a:t>
+            </a:r>
+            <a:r>
+              <a:rPr lang="en-US" altLang="ko-KR" dirty="0"/>
+              <a:t>-&gt; </a:t>
+            </a:r>
+            <a:r>
+              <a:rPr lang="ko-KR" altLang="en-US" dirty="0"/>
+              <a:t>결과물이 간소화 됨</a:t>
+            </a:r>
+            <a:endParaRPr lang="en-US" altLang="ko-KR" dirty="0"/>
+          </a:p>
+          <a:p>
+            <a:r>
+              <a:rPr lang="ko-KR" altLang="en-US" dirty="0"/>
+              <a:t>게임의 요소 하나하나에 생각보다 디테일이 많아서 구현에 어려움을 겪었다</a:t>
+            </a:r>
+            <a:r>
+              <a:rPr lang="en-US" altLang="ko-KR" dirty="0"/>
+              <a:t>.</a:t>
+            </a:r>
+          </a:p>
+          <a:p>
+            <a:endParaRPr lang="ko-KR" altLang="en-US" dirty="0"/>
+          </a:p>
+        </p:txBody>
+      </p:sp>
+    </p:spTree>
+    <p:extLst>
+      <p:ext uri="{BB962C8B-B14F-4D97-AF65-F5344CB8AC3E}">
+        <p14:creationId xmlns:p14="http://schemas.microsoft.com/office/powerpoint/2010/main" val="2385676835"/>
+      </p:ext>
+    </p:extLst>
+  </p:cSld>
+  <p:clrMapOvr>
+    <a:masterClrMapping/>
+  </p:clrMapOvr>
+</p:sld>
+</file>
+
+<file path=ppt/slides/slide7.xml><?xml version="1.0" encoding="utf-8"?>
+<p:sld xmlns:a="http://schemas.openxmlformats.org/drawingml/2006/main" xmlns:r="http://schemas.openxmlformats.org/officeDocument/2006/relationships" xmlns:p="http://schemas.openxmlformats.org/presentationml/2006/main">
+  <p:cSld>
+    <p:spTree>
+      <p:nvGrpSpPr>
+        <p:cNvPr id="1" name=""/>
+        <p:cNvGrpSpPr/>
+        <p:nvPr/>
+      </p:nvGrpSpPr>
+      <p:grpSpPr>
+        <a:xfrm>
+          <a:off x="0" y="0"/>
+          <a:ext cx="0" cy="0"/>
+          <a:chOff x="0" y="0"/>
+          <a:chExt cx="0" cy="0"/>
+        </a:xfrm>
+      </p:grpSpPr>
+      <p:sp>
+        <p:nvSpPr>
+          <p:cNvPr id="2" name="제목 1">
+            <a:extLst>
+              <a:ext uri="{FF2B5EF4-FFF2-40B4-BE49-F238E27FC236}">
+                <a16:creationId xmlns:a16="http://schemas.microsoft.com/office/drawing/2014/main" id="{3128F7CB-4E04-80B2-B611-7C874BECF6D2}"/>
+              </a:ext>
+            </a:extLst>
+          </p:cNvPr>
+          <p:cNvSpPr>
+            <a:spLocks noGrp="1"/>
+          </p:cNvSpPr>
+          <p:nvPr>
+            <p:ph type="title"/>
+          </p:nvPr>
+        </p:nvSpPr>
+        <p:spPr/>
+        <p:txBody>
+          <a:bodyPr/>
+          <a:lstStyle/>
+          <a:p>
+            <a:r>
+              <a:rPr lang="en-US" altLang="ko-KR" dirty="0"/>
+              <a:t>Q &amp; A</a:t>
+            </a:r>
+            <a:endParaRPr lang="ko-KR" altLang="en-US" dirty="0"/>
+          </a:p>
+        </p:txBody>
+      </p:sp>
+      <p:sp>
+        <p:nvSpPr>
+          <p:cNvPr id="3" name="내용 개체 틀 2">
+            <a:extLst>
+              <a:ext uri="{FF2B5EF4-FFF2-40B4-BE49-F238E27FC236}">
+                <a16:creationId xmlns:a16="http://schemas.microsoft.com/office/drawing/2014/main" id="{EE826393-A05B-2D09-A25D-231A29B52D64}"/>
+              </a:ext>
+            </a:extLst>
+          </p:cNvPr>
+          <p:cNvSpPr>
+            <a:spLocks noGrp="1"/>
+          </p:cNvSpPr>
+          <p:nvPr>
+            <p:ph idx="1"/>
+          </p:nvPr>
+        </p:nvSpPr>
+        <p:spPr/>
+        <p:txBody>
+          <a:bodyPr/>
+          <a:lstStyle/>
+          <a:p>
+            <a:pPr marL="0" indent="0">
+              <a:buNone/>
+            </a:pPr>
+            <a:endParaRPr lang="en-US" altLang="ko-KR" dirty="0"/>
+          </a:p>
+          <a:p>
+            <a:pPr marL="0" indent="0">
+              <a:buNone/>
+            </a:pPr>
+            <a:r>
+              <a:rPr lang="ko-KR" altLang="en-US" dirty="0"/>
+              <a:t>감사합니다</a:t>
+            </a:r>
+            <a:r>
+              <a:rPr lang="en-US" altLang="ko-KR" dirty="0"/>
+              <a:t>.</a:t>
+            </a:r>
+          </a:p>
+        </p:txBody>
+      </p:sp>
+    </p:spTree>
+    <p:extLst>
+      <p:ext uri="{BB962C8B-B14F-4D97-AF65-F5344CB8AC3E}">
+        <p14:creationId xmlns:p14="http://schemas.microsoft.com/office/powerpoint/2010/main" val="2071959392"/>
       </p:ext>
     </p:extLst>
   </p:cSld>

</xml_diff>